<commit_message>
Renamed Run and Break to OHB. Completed BAS04.
</commit_message>
<xml_diff>
--- a/TRP/BAS/BAS-03/494(P)-BAS-03 - Trainee Presentation.pptx
+++ b/TRP/BAS/BAS-03/494(P)-BAS-03 - Trainee Presentation.pptx
@@ -258,6 +258,453 @@
 
 <file path=ppt/changesInfos/changesInfo1.xml><?xml version="1.0" encoding="utf-8"?>
 <pc:chgInfo xmlns:a="http://schemas.openxmlformats.org/drawingml/2006/main" xmlns:r="http://schemas.openxmlformats.org/officeDocument/2006/relationships" xmlns:ac="http://schemas.microsoft.com/office/drawing/2013/main/command" xmlns:pc="http://schemas.microsoft.com/office/powerpoint/2013/main/command">
+  <pc:docChgLst>
+    <pc:chgData name="Adam Arkley" userId="d399d8a812f0f754" providerId="LiveId" clId="{E93054AD-10A9-4843-AFF1-99DF7BB257C6}"/>
+    <pc:docChg chg="undo custSel addSld modSld sldOrd addSection delSection modSection">
+      <pc:chgData name="Adam Arkley" userId="d399d8a812f0f754" providerId="LiveId" clId="{E93054AD-10A9-4843-AFF1-99DF7BB257C6}" dt="2020-09-26T17:30:21.785" v="7354" actId="20577"/>
+      <pc:docMkLst>
+        <pc:docMk/>
+      </pc:docMkLst>
+      <pc:sldChg chg="modSp mod">
+        <pc:chgData name="Adam Arkley" userId="d399d8a812f0f754" providerId="LiveId" clId="{E93054AD-10A9-4843-AFF1-99DF7BB257C6}" dt="2020-09-26T17:30:21.785" v="7354" actId="20577"/>
+        <pc:sldMkLst>
+          <pc:docMk/>
+          <pc:sldMk cId="2701037055" sldId="256"/>
+        </pc:sldMkLst>
+        <pc:spChg chg="mod">
+          <ac:chgData name="Adam Arkley" userId="d399d8a812f0f754" providerId="LiveId" clId="{E93054AD-10A9-4843-AFF1-99DF7BB257C6}" dt="2020-09-26T17:30:21.785" v="7354" actId="20577"/>
+          <ac:spMkLst>
+            <pc:docMk/>
+            <pc:sldMk cId="2701037055" sldId="256"/>
+            <ac:spMk id="2" creationId="{B85CA9A3-4DC8-45AC-92F2-BEE16ECE63EB}"/>
+          </ac:spMkLst>
+        </pc:spChg>
+        <pc:spChg chg="mod">
+          <ac:chgData name="Adam Arkley" userId="d399d8a812f0f754" providerId="LiveId" clId="{E93054AD-10A9-4843-AFF1-99DF7BB257C6}" dt="2020-09-26T17:02:07.794" v="7349" actId="20577"/>
+          <ac:spMkLst>
+            <pc:docMk/>
+            <pc:sldMk cId="2701037055" sldId="256"/>
+            <ac:spMk id="4" creationId="{0F370610-8E27-43C6-88E0-34FB0AF38598}"/>
+          </ac:spMkLst>
+        </pc:spChg>
+        <pc:spChg chg="mod">
+          <ac:chgData name="Adam Arkley" userId="d399d8a812f0f754" providerId="LiveId" clId="{E93054AD-10A9-4843-AFF1-99DF7BB257C6}" dt="2020-09-26T17:02:09.730" v="7351" actId="20577"/>
+          <ac:spMkLst>
+            <pc:docMk/>
+            <pc:sldMk cId="2701037055" sldId="256"/>
+            <ac:spMk id="6" creationId="{424E565A-5570-49BD-91D8-FCEE7A8CF147}"/>
+          </ac:spMkLst>
+        </pc:spChg>
+      </pc:sldChg>
+      <pc:sldChg chg="modSp mod">
+        <pc:chgData name="Adam Arkley" userId="d399d8a812f0f754" providerId="LiveId" clId="{E93054AD-10A9-4843-AFF1-99DF7BB257C6}" dt="2020-09-26T16:30:37.121" v="3671" actId="6549"/>
+        <pc:sldMkLst>
+          <pc:docMk/>
+          <pc:sldMk cId="591849276" sldId="257"/>
+        </pc:sldMkLst>
+        <pc:spChg chg="mod">
+          <ac:chgData name="Adam Arkley" userId="d399d8a812f0f754" providerId="LiveId" clId="{E93054AD-10A9-4843-AFF1-99DF7BB257C6}" dt="2020-09-26T16:30:37.121" v="3671" actId="6549"/>
+          <ac:spMkLst>
+            <pc:docMk/>
+            <pc:sldMk cId="591849276" sldId="257"/>
+            <ac:spMk id="8" creationId="{BE0E3DF2-7D61-4E65-B9C8-8C8786AC82BB}"/>
+          </ac:spMkLst>
+        </pc:spChg>
+      </pc:sldChg>
+      <pc:sldChg chg="addSp modSp mod">
+        <pc:chgData name="Adam Arkley" userId="d399d8a812f0f754" providerId="LiveId" clId="{E93054AD-10A9-4843-AFF1-99DF7BB257C6}" dt="2020-09-26T16:10:13.222" v="387" actId="1076"/>
+        <pc:sldMkLst>
+          <pc:docMk/>
+          <pc:sldMk cId="842297462" sldId="280"/>
+        </pc:sldMkLst>
+        <pc:spChg chg="mod">
+          <ac:chgData name="Adam Arkley" userId="d399d8a812f0f754" providerId="LiveId" clId="{E93054AD-10A9-4843-AFF1-99DF7BB257C6}" dt="2020-09-26T16:10:10.043" v="385" actId="14100"/>
+          <ac:spMkLst>
+            <pc:docMk/>
+            <pc:sldMk cId="842297462" sldId="280"/>
+            <ac:spMk id="7" creationId="{81C08BC2-19A8-464B-A2C7-FE134A960E49}"/>
+          </ac:spMkLst>
+        </pc:spChg>
+        <pc:picChg chg="add mod">
+          <ac:chgData name="Adam Arkley" userId="d399d8a812f0f754" providerId="LiveId" clId="{E93054AD-10A9-4843-AFF1-99DF7BB257C6}" dt="2020-09-26T16:10:13.222" v="387" actId="1076"/>
+          <ac:picMkLst>
+            <pc:docMk/>
+            <pc:sldMk cId="842297462" sldId="280"/>
+            <ac:picMk id="3" creationId="{D9F2B9E1-D7E9-4CCE-AAD9-EEA633C47420}"/>
+          </ac:picMkLst>
+        </pc:picChg>
+      </pc:sldChg>
+      <pc:sldChg chg="addSp modSp add mod ord">
+        <pc:chgData name="Adam Arkley" userId="d399d8a812f0f754" providerId="LiveId" clId="{E93054AD-10A9-4843-AFF1-99DF7BB257C6}" dt="2020-09-26T16:12:13.880" v="837" actId="20577"/>
+        <pc:sldMkLst>
+          <pc:docMk/>
+          <pc:sldMk cId="1894822069" sldId="281"/>
+        </pc:sldMkLst>
+        <pc:spChg chg="mod">
+          <ac:chgData name="Adam Arkley" userId="d399d8a812f0f754" providerId="LiveId" clId="{E93054AD-10A9-4843-AFF1-99DF7BB257C6}" dt="2020-09-26T16:10:21.208" v="395" actId="20577"/>
+          <ac:spMkLst>
+            <pc:docMk/>
+            <pc:sldMk cId="1894822069" sldId="281"/>
+            <ac:spMk id="6" creationId="{C5372D0A-E260-4F85-BA5F-02B997435337}"/>
+          </ac:spMkLst>
+        </pc:spChg>
+        <pc:spChg chg="mod">
+          <ac:chgData name="Adam Arkley" userId="d399d8a812f0f754" providerId="LiveId" clId="{E93054AD-10A9-4843-AFF1-99DF7BB257C6}" dt="2020-09-26T16:12:13.880" v="837" actId="20577"/>
+          <ac:spMkLst>
+            <pc:docMk/>
+            <pc:sldMk cId="1894822069" sldId="281"/>
+            <ac:spMk id="7" creationId="{81C08BC2-19A8-464B-A2C7-FE134A960E49}"/>
+          </ac:spMkLst>
+        </pc:spChg>
+        <pc:picChg chg="add mod">
+          <ac:chgData name="Adam Arkley" userId="d399d8a812f0f754" providerId="LiveId" clId="{E93054AD-10A9-4843-AFF1-99DF7BB257C6}" dt="2020-09-26T16:11:53.379" v="665" actId="1076"/>
+          <ac:picMkLst>
+            <pc:docMk/>
+            <pc:sldMk cId="1894822069" sldId="281"/>
+            <ac:picMk id="3" creationId="{98E18573-2B0F-4E91-BC70-DF42EFD70566}"/>
+          </ac:picMkLst>
+        </pc:picChg>
+      </pc:sldChg>
+      <pc:sldChg chg="addSp delSp modSp add mod">
+        <pc:chgData name="Adam Arkley" userId="d399d8a812f0f754" providerId="LiveId" clId="{E93054AD-10A9-4843-AFF1-99DF7BB257C6}" dt="2020-09-26T16:15:20.129" v="1224" actId="20577"/>
+        <pc:sldMkLst>
+          <pc:docMk/>
+          <pc:sldMk cId="862832244" sldId="282"/>
+        </pc:sldMkLst>
+        <pc:spChg chg="mod">
+          <ac:chgData name="Adam Arkley" userId="d399d8a812f0f754" providerId="LiveId" clId="{E93054AD-10A9-4843-AFF1-99DF7BB257C6}" dt="2020-09-26T16:15:20.129" v="1224" actId="20577"/>
+          <ac:spMkLst>
+            <pc:docMk/>
+            <pc:sldMk cId="862832244" sldId="282"/>
+            <ac:spMk id="7" creationId="{81C08BC2-19A8-464B-A2C7-FE134A960E49}"/>
+          </ac:spMkLst>
+        </pc:spChg>
+        <pc:picChg chg="del">
+          <ac:chgData name="Adam Arkley" userId="d399d8a812f0f754" providerId="LiveId" clId="{E93054AD-10A9-4843-AFF1-99DF7BB257C6}" dt="2020-09-26T16:14:26.543" v="839" actId="478"/>
+          <ac:picMkLst>
+            <pc:docMk/>
+            <pc:sldMk cId="862832244" sldId="282"/>
+            <ac:picMk id="3" creationId="{98E18573-2B0F-4E91-BC70-DF42EFD70566}"/>
+          </ac:picMkLst>
+        </pc:picChg>
+        <pc:picChg chg="add mod">
+          <ac:chgData name="Adam Arkley" userId="d399d8a812f0f754" providerId="LiveId" clId="{E93054AD-10A9-4843-AFF1-99DF7BB257C6}" dt="2020-09-26T16:14:32.523" v="842" actId="1076"/>
+          <ac:picMkLst>
+            <pc:docMk/>
+            <pc:sldMk cId="862832244" sldId="282"/>
+            <ac:picMk id="4" creationId="{43970568-6A7E-4DAB-BDB0-3B04E33C477A}"/>
+          </ac:picMkLst>
+        </pc:picChg>
+      </pc:sldChg>
+      <pc:sldChg chg="modSp add mod ord">
+        <pc:chgData name="Adam Arkley" userId="d399d8a812f0f754" providerId="LiveId" clId="{E93054AD-10A9-4843-AFF1-99DF7BB257C6}" dt="2020-09-26T16:18:51.925" v="2118" actId="20577"/>
+        <pc:sldMkLst>
+          <pc:docMk/>
+          <pc:sldMk cId="3477152732" sldId="283"/>
+        </pc:sldMkLst>
+        <pc:spChg chg="mod">
+          <ac:chgData name="Adam Arkley" userId="d399d8a812f0f754" providerId="LiveId" clId="{E93054AD-10A9-4843-AFF1-99DF7BB257C6}" dt="2020-09-26T16:15:29.887" v="1233" actId="20577"/>
+          <ac:spMkLst>
+            <pc:docMk/>
+            <pc:sldMk cId="3477152732" sldId="283"/>
+            <ac:spMk id="6" creationId="{C5372D0A-E260-4F85-BA5F-02B997435337}"/>
+          </ac:spMkLst>
+        </pc:spChg>
+        <pc:spChg chg="mod">
+          <ac:chgData name="Adam Arkley" userId="d399d8a812f0f754" providerId="LiveId" clId="{E93054AD-10A9-4843-AFF1-99DF7BB257C6}" dt="2020-09-26T16:18:51.925" v="2118" actId="20577"/>
+          <ac:spMkLst>
+            <pc:docMk/>
+            <pc:sldMk cId="3477152732" sldId="283"/>
+            <ac:spMk id="7" creationId="{81C08BC2-19A8-464B-A2C7-FE134A960E49}"/>
+          </ac:spMkLst>
+        </pc:spChg>
+      </pc:sldChg>
+      <pc:sldChg chg="modSp add mod">
+        <pc:chgData name="Adam Arkley" userId="d399d8a812f0f754" providerId="LiveId" clId="{E93054AD-10A9-4843-AFF1-99DF7BB257C6}" dt="2020-09-26T16:26:24.981" v="3059" actId="20577"/>
+        <pc:sldMkLst>
+          <pc:docMk/>
+          <pc:sldMk cId="383464206" sldId="284"/>
+        </pc:sldMkLst>
+        <pc:spChg chg="mod">
+          <ac:chgData name="Adam Arkley" userId="d399d8a812f0f754" providerId="LiveId" clId="{E93054AD-10A9-4843-AFF1-99DF7BB257C6}" dt="2020-09-26T16:19:47.707" v="2129" actId="20577"/>
+          <ac:spMkLst>
+            <pc:docMk/>
+            <pc:sldMk cId="383464206" sldId="284"/>
+            <ac:spMk id="6" creationId="{C5372D0A-E260-4F85-BA5F-02B997435337}"/>
+          </ac:spMkLst>
+        </pc:spChg>
+        <pc:spChg chg="mod">
+          <ac:chgData name="Adam Arkley" userId="d399d8a812f0f754" providerId="LiveId" clId="{E93054AD-10A9-4843-AFF1-99DF7BB257C6}" dt="2020-09-26T16:26:24.981" v="3059" actId="20577"/>
+          <ac:spMkLst>
+            <pc:docMk/>
+            <pc:sldMk cId="383464206" sldId="284"/>
+            <ac:spMk id="7" creationId="{81C08BC2-19A8-464B-A2C7-FE134A960E49}"/>
+          </ac:spMkLst>
+        </pc:spChg>
+      </pc:sldChg>
+      <pc:sldChg chg="addSp modSp add mod ord">
+        <pc:chgData name="Adam Arkley" userId="d399d8a812f0f754" providerId="LiveId" clId="{E93054AD-10A9-4843-AFF1-99DF7BB257C6}" dt="2020-09-26T16:23:55.895" v="2641"/>
+        <pc:sldMkLst>
+          <pc:docMk/>
+          <pc:sldMk cId="41099643" sldId="285"/>
+        </pc:sldMkLst>
+        <pc:spChg chg="mod">
+          <ac:chgData name="Adam Arkley" userId="d399d8a812f0f754" providerId="LiveId" clId="{E93054AD-10A9-4843-AFF1-99DF7BB257C6}" dt="2020-09-26T16:21:09.288" v="2147" actId="20577"/>
+          <ac:spMkLst>
+            <pc:docMk/>
+            <pc:sldMk cId="41099643" sldId="285"/>
+            <ac:spMk id="6" creationId="{C5372D0A-E260-4F85-BA5F-02B997435337}"/>
+          </ac:spMkLst>
+        </pc:spChg>
+        <pc:spChg chg="mod">
+          <ac:chgData name="Adam Arkley" userId="d399d8a812f0f754" providerId="LiveId" clId="{E93054AD-10A9-4843-AFF1-99DF7BB257C6}" dt="2020-09-26T16:22:00.483" v="2517" actId="20577"/>
+          <ac:spMkLst>
+            <pc:docMk/>
+            <pc:sldMk cId="41099643" sldId="285"/>
+            <ac:spMk id="7" creationId="{81C08BC2-19A8-464B-A2C7-FE134A960E49}"/>
+          </ac:spMkLst>
+        </pc:spChg>
+        <pc:graphicFrameChg chg="add mod modGraphic">
+          <ac:chgData name="Adam Arkley" userId="d399d8a812f0f754" providerId="LiveId" clId="{E93054AD-10A9-4843-AFF1-99DF7BB257C6}" dt="2020-09-26T16:23:52.736" v="2639" actId="1076"/>
+          <ac:graphicFrameMkLst>
+            <pc:docMk/>
+            <pc:sldMk cId="41099643" sldId="285"/>
+            <ac:graphicFrameMk id="2" creationId="{4F625300-029E-4D4D-A08F-445DE3795F69}"/>
+          </ac:graphicFrameMkLst>
+        </pc:graphicFrameChg>
+      </pc:sldChg>
+      <pc:sldChg chg="modSp add mod ord">
+        <pc:chgData name="Adam Arkley" userId="d399d8a812f0f754" providerId="LiveId" clId="{E93054AD-10A9-4843-AFF1-99DF7BB257C6}" dt="2020-09-26T16:29:27.551" v="3670" actId="20577"/>
+        <pc:sldMkLst>
+          <pc:docMk/>
+          <pc:sldMk cId="2213527629" sldId="286"/>
+        </pc:sldMkLst>
+        <pc:spChg chg="mod">
+          <ac:chgData name="Adam Arkley" userId="d399d8a812f0f754" providerId="LiveId" clId="{E93054AD-10A9-4843-AFF1-99DF7BB257C6}" dt="2020-09-26T16:26:45.663" v="3096" actId="20577"/>
+          <ac:spMkLst>
+            <pc:docMk/>
+            <pc:sldMk cId="2213527629" sldId="286"/>
+            <ac:spMk id="6" creationId="{C5372D0A-E260-4F85-BA5F-02B997435337}"/>
+          </ac:spMkLst>
+        </pc:spChg>
+        <pc:spChg chg="mod">
+          <ac:chgData name="Adam Arkley" userId="d399d8a812f0f754" providerId="LiveId" clId="{E93054AD-10A9-4843-AFF1-99DF7BB257C6}" dt="2020-09-26T16:29:27.551" v="3670" actId="20577"/>
+          <ac:spMkLst>
+            <pc:docMk/>
+            <pc:sldMk cId="2213527629" sldId="286"/>
+            <ac:spMk id="7" creationId="{81C08BC2-19A8-464B-A2C7-FE134A960E49}"/>
+          </ac:spMkLst>
+        </pc:spChg>
+      </pc:sldChg>
+      <pc:sldChg chg="modSp add mod ord">
+        <pc:chgData name="Adam Arkley" userId="d399d8a812f0f754" providerId="LiveId" clId="{E93054AD-10A9-4843-AFF1-99DF7BB257C6}" dt="2020-09-26T16:33:54.715" v="3751" actId="20577"/>
+        <pc:sldMkLst>
+          <pc:docMk/>
+          <pc:sldMk cId="1966687124" sldId="287"/>
+        </pc:sldMkLst>
+        <pc:spChg chg="mod">
+          <ac:chgData name="Adam Arkley" userId="d399d8a812f0f754" providerId="LiveId" clId="{E93054AD-10A9-4843-AFF1-99DF7BB257C6}" dt="2020-09-26T16:30:52.926" v="3683" actId="20577"/>
+          <ac:spMkLst>
+            <pc:docMk/>
+            <pc:sldMk cId="1966687124" sldId="287"/>
+            <ac:spMk id="7" creationId="{264D352A-6490-4480-892C-323D5009DE9E}"/>
+          </ac:spMkLst>
+        </pc:spChg>
+        <pc:spChg chg="mod">
+          <ac:chgData name="Adam Arkley" userId="d399d8a812f0f754" providerId="LiveId" clId="{E93054AD-10A9-4843-AFF1-99DF7BB257C6}" dt="2020-09-26T16:33:54.715" v="3751" actId="20577"/>
+          <ac:spMkLst>
+            <pc:docMk/>
+            <pc:sldMk cId="1966687124" sldId="287"/>
+            <ac:spMk id="8" creationId="{BE0E3DF2-7D61-4E65-B9C8-8C8786AC82BB}"/>
+          </ac:spMkLst>
+        </pc:spChg>
+      </pc:sldChg>
+      <pc:sldChg chg="modSp add mod ord">
+        <pc:chgData name="Adam Arkley" userId="d399d8a812f0f754" providerId="LiveId" clId="{E93054AD-10A9-4843-AFF1-99DF7BB257C6}" dt="2020-09-26T16:46:33.777" v="4813" actId="20577"/>
+        <pc:sldMkLst>
+          <pc:docMk/>
+          <pc:sldMk cId="424534578" sldId="288"/>
+        </pc:sldMkLst>
+        <pc:spChg chg="mod">
+          <ac:chgData name="Adam Arkley" userId="d399d8a812f0f754" providerId="LiveId" clId="{E93054AD-10A9-4843-AFF1-99DF7BB257C6}" dt="2020-09-26T16:45:46.271" v="4560" actId="20577"/>
+          <ac:spMkLst>
+            <pc:docMk/>
+            <pc:sldMk cId="424534578" sldId="288"/>
+            <ac:spMk id="6" creationId="{C5372D0A-E260-4F85-BA5F-02B997435337}"/>
+          </ac:spMkLst>
+        </pc:spChg>
+        <pc:spChg chg="mod">
+          <ac:chgData name="Adam Arkley" userId="d399d8a812f0f754" providerId="LiveId" clId="{E93054AD-10A9-4843-AFF1-99DF7BB257C6}" dt="2020-09-26T16:46:33.777" v="4813" actId="20577"/>
+          <ac:spMkLst>
+            <pc:docMk/>
+            <pc:sldMk cId="424534578" sldId="288"/>
+            <ac:spMk id="7" creationId="{81C08BC2-19A8-464B-A2C7-FE134A960E49}"/>
+          </ac:spMkLst>
+        </pc:spChg>
+      </pc:sldChg>
+      <pc:sldChg chg="modSp add mod ord">
+        <pc:chgData name="Adam Arkley" userId="d399d8a812f0f754" providerId="LiveId" clId="{E93054AD-10A9-4843-AFF1-99DF7BB257C6}" dt="2020-09-26T16:45:35.606" v="4523"/>
+        <pc:sldMkLst>
+          <pc:docMk/>
+          <pc:sldMk cId="3942793224" sldId="289"/>
+        </pc:sldMkLst>
+        <pc:spChg chg="mod">
+          <ac:chgData name="Adam Arkley" userId="d399d8a812f0f754" providerId="LiveId" clId="{E93054AD-10A9-4843-AFF1-99DF7BB257C6}" dt="2020-09-26T16:45:34.612" v="4521"/>
+          <ac:spMkLst>
+            <pc:docMk/>
+            <pc:sldMk cId="3942793224" sldId="289"/>
+            <ac:spMk id="7" creationId="{81C08BC2-19A8-464B-A2C7-FE134A960E49}"/>
+          </ac:spMkLst>
+        </pc:spChg>
+      </pc:sldChg>
+      <pc:sldChg chg="addSp delSp modSp add mod">
+        <pc:chgData name="Adam Arkley" userId="d399d8a812f0f754" providerId="LiveId" clId="{E93054AD-10A9-4843-AFF1-99DF7BB257C6}" dt="2020-09-26T16:54:09.396" v="5354" actId="255"/>
+        <pc:sldMkLst>
+          <pc:docMk/>
+          <pc:sldMk cId="1298131675" sldId="290"/>
+        </pc:sldMkLst>
+        <pc:spChg chg="mod">
+          <ac:chgData name="Adam Arkley" userId="d399d8a812f0f754" providerId="LiveId" clId="{E93054AD-10A9-4843-AFF1-99DF7BB257C6}" dt="2020-09-26T16:46:55.970" v="4821" actId="20577"/>
+          <ac:spMkLst>
+            <pc:docMk/>
+            <pc:sldMk cId="1298131675" sldId="290"/>
+            <ac:spMk id="6" creationId="{C5372D0A-E260-4F85-BA5F-02B997435337}"/>
+          </ac:spMkLst>
+        </pc:spChg>
+        <pc:spChg chg="mod">
+          <ac:chgData name="Adam Arkley" userId="d399d8a812f0f754" providerId="LiveId" clId="{E93054AD-10A9-4843-AFF1-99DF7BB257C6}" dt="2020-09-26T16:54:09.396" v="5354" actId="255"/>
+          <ac:spMkLst>
+            <pc:docMk/>
+            <pc:sldMk cId="1298131675" sldId="290"/>
+            <ac:spMk id="7" creationId="{81C08BC2-19A8-464B-A2C7-FE134A960E49}"/>
+          </ac:spMkLst>
+        </pc:spChg>
+        <pc:picChg chg="add del mod">
+          <ac:chgData name="Adam Arkley" userId="d399d8a812f0f754" providerId="LiveId" clId="{E93054AD-10A9-4843-AFF1-99DF7BB257C6}" dt="2020-09-26T16:52:16.819" v="5093" actId="21"/>
+          <ac:picMkLst>
+            <pc:docMk/>
+            <pc:sldMk cId="1298131675" sldId="290"/>
+            <ac:picMk id="3" creationId="{9E4A8263-DA0D-4BED-8E02-E63E61F018C9}"/>
+          </ac:picMkLst>
+        </pc:picChg>
+        <pc:picChg chg="add mod">
+          <ac:chgData name="Adam Arkley" userId="d399d8a812f0f754" providerId="LiveId" clId="{E93054AD-10A9-4843-AFF1-99DF7BB257C6}" dt="2020-09-26T16:52:35.673" v="5098" actId="1076"/>
+          <ac:picMkLst>
+            <pc:docMk/>
+            <pc:sldMk cId="1298131675" sldId="290"/>
+            <ac:picMk id="5" creationId="{0514DE11-F2CE-45C7-BF35-1E56DA6C7284}"/>
+          </ac:picMkLst>
+        </pc:picChg>
+      </pc:sldChg>
+      <pc:sldChg chg="modSp add mod ord">
+        <pc:chgData name="Adam Arkley" userId="d399d8a812f0f754" providerId="LiveId" clId="{E93054AD-10A9-4843-AFF1-99DF7BB257C6}" dt="2020-09-26T16:57:55.902" v="6047" actId="20577"/>
+        <pc:sldMkLst>
+          <pc:docMk/>
+          <pc:sldMk cId="1126652675" sldId="291"/>
+        </pc:sldMkLst>
+        <pc:spChg chg="mod">
+          <ac:chgData name="Adam Arkley" userId="d399d8a812f0f754" providerId="LiveId" clId="{E93054AD-10A9-4843-AFF1-99DF7BB257C6}" dt="2020-09-26T16:55:37.417" v="5364" actId="20577"/>
+          <ac:spMkLst>
+            <pc:docMk/>
+            <pc:sldMk cId="1126652675" sldId="291"/>
+            <ac:spMk id="6" creationId="{C5372D0A-E260-4F85-BA5F-02B997435337}"/>
+          </ac:spMkLst>
+        </pc:spChg>
+        <pc:spChg chg="mod">
+          <ac:chgData name="Adam Arkley" userId="d399d8a812f0f754" providerId="LiveId" clId="{E93054AD-10A9-4843-AFF1-99DF7BB257C6}" dt="2020-09-26T16:57:55.902" v="6047" actId="20577"/>
+          <ac:spMkLst>
+            <pc:docMk/>
+            <pc:sldMk cId="1126652675" sldId="291"/>
+            <ac:spMk id="7" creationId="{81C08BC2-19A8-464B-A2C7-FE134A960E49}"/>
+          </ac:spMkLst>
+        </pc:spChg>
+      </pc:sldChg>
+      <pc:sldChg chg="modSp add mod ord">
+        <pc:chgData name="Adam Arkley" userId="d399d8a812f0f754" providerId="LiveId" clId="{E93054AD-10A9-4843-AFF1-99DF7BB257C6}" dt="2020-09-26T16:58:20.312" v="6103" actId="20577"/>
+        <pc:sldMkLst>
+          <pc:docMk/>
+          <pc:sldMk cId="4159823134" sldId="292"/>
+        </pc:sldMkLst>
+        <pc:spChg chg="mod">
+          <ac:chgData name="Adam Arkley" userId="d399d8a812f0f754" providerId="LiveId" clId="{E93054AD-10A9-4843-AFF1-99DF7BB257C6}" dt="2020-09-26T16:58:15.767" v="6078" actId="20577"/>
+          <ac:spMkLst>
+            <pc:docMk/>
+            <pc:sldMk cId="4159823134" sldId="292"/>
+            <ac:spMk id="7" creationId="{264D352A-6490-4480-892C-323D5009DE9E}"/>
+          </ac:spMkLst>
+        </pc:spChg>
+        <pc:spChg chg="mod">
+          <ac:chgData name="Adam Arkley" userId="d399d8a812f0f754" providerId="LiveId" clId="{E93054AD-10A9-4843-AFF1-99DF7BB257C6}" dt="2020-09-26T16:58:20.312" v="6103" actId="20577"/>
+          <ac:spMkLst>
+            <pc:docMk/>
+            <pc:sldMk cId="4159823134" sldId="292"/>
+            <ac:spMk id="8" creationId="{BE0E3DF2-7D61-4E65-B9C8-8C8786AC82BB}"/>
+          </ac:spMkLst>
+        </pc:spChg>
+      </pc:sldChg>
+      <pc:sldChg chg="modSp add mod ord">
+        <pc:chgData name="Adam Arkley" userId="d399d8a812f0f754" providerId="LiveId" clId="{E93054AD-10A9-4843-AFF1-99DF7BB257C6}" dt="2020-09-26T17:01:53.160" v="7343" actId="20577"/>
+        <pc:sldMkLst>
+          <pc:docMk/>
+          <pc:sldMk cId="1706075808" sldId="293"/>
+        </pc:sldMkLst>
+        <pc:spChg chg="mod">
+          <ac:chgData name="Adam Arkley" userId="d399d8a812f0f754" providerId="LiveId" clId="{E93054AD-10A9-4843-AFF1-99DF7BB257C6}" dt="2020-09-26T17:01:11.011" v="6982" actId="20577"/>
+          <ac:spMkLst>
+            <pc:docMk/>
+            <pc:sldMk cId="1706075808" sldId="293"/>
+            <ac:spMk id="6" creationId="{C5372D0A-E260-4F85-BA5F-02B997435337}"/>
+          </ac:spMkLst>
+        </pc:spChg>
+        <pc:spChg chg="mod">
+          <ac:chgData name="Adam Arkley" userId="d399d8a812f0f754" providerId="LiveId" clId="{E93054AD-10A9-4843-AFF1-99DF7BB257C6}" dt="2020-09-26T17:01:53.160" v="7343" actId="20577"/>
+          <ac:spMkLst>
+            <pc:docMk/>
+            <pc:sldMk cId="1706075808" sldId="293"/>
+            <ac:spMk id="7" creationId="{81C08BC2-19A8-464B-A2C7-FE134A960E49}"/>
+          </ac:spMkLst>
+        </pc:spChg>
+      </pc:sldChg>
+      <pc:sldChg chg="addSp modSp add mod">
+        <pc:chgData name="Adam Arkley" userId="d399d8a812f0f754" providerId="LiveId" clId="{E93054AD-10A9-4843-AFF1-99DF7BB257C6}" dt="2020-09-26T17:00:21.291" v="6583" actId="255"/>
+        <pc:sldMkLst>
+          <pc:docMk/>
+          <pc:sldMk cId="2356349418" sldId="294"/>
+        </pc:sldMkLst>
+        <pc:spChg chg="mod">
+          <ac:chgData name="Adam Arkley" userId="d399d8a812f0f754" providerId="LiveId" clId="{E93054AD-10A9-4843-AFF1-99DF7BB257C6}" dt="2020-09-26T17:00:21.291" v="6583" actId="255"/>
+          <ac:spMkLst>
+            <pc:docMk/>
+            <pc:sldMk cId="2356349418" sldId="294"/>
+            <ac:spMk id="7" creationId="{81C08BC2-19A8-464B-A2C7-FE134A960E49}"/>
+          </ac:spMkLst>
+        </pc:spChg>
+        <pc:picChg chg="add mod">
+          <ac:chgData name="Adam Arkley" userId="d399d8a812f0f754" providerId="LiveId" clId="{E93054AD-10A9-4843-AFF1-99DF7BB257C6}" dt="2020-09-26T16:59:52.519" v="6516" actId="1076"/>
+          <ac:picMkLst>
+            <pc:docMk/>
+            <pc:sldMk cId="2356349418" sldId="294"/>
+            <ac:picMk id="3" creationId="{9EADA46F-A349-409E-BEC5-E81117F26BB3}"/>
+          </ac:picMkLst>
+        </pc:picChg>
+      </pc:sldChg>
+      <pc:sldChg chg="modSp add mod ord">
+        <pc:chgData name="Adam Arkley" userId="d399d8a812f0f754" providerId="LiveId" clId="{E93054AD-10A9-4843-AFF1-99DF7BB257C6}" dt="2020-09-26T17:01:05.887" v="6957" actId="20577"/>
+        <pc:sldMkLst>
+          <pc:docMk/>
+          <pc:sldMk cId="769937497" sldId="295"/>
+        </pc:sldMkLst>
+        <pc:spChg chg="mod">
+          <ac:chgData name="Adam Arkley" userId="d399d8a812f0f754" providerId="LiveId" clId="{E93054AD-10A9-4843-AFF1-99DF7BB257C6}" dt="2020-09-26T17:01:05.887" v="6957" actId="20577"/>
+          <ac:spMkLst>
+            <pc:docMk/>
+            <pc:sldMk cId="769937497" sldId="295"/>
+            <ac:spMk id="7" creationId="{81C08BC2-19A8-464B-A2C7-FE134A960E49}"/>
+          </ac:spMkLst>
+        </pc:spChg>
+      </pc:sldChg>
+    </pc:docChg>
+  </pc:docChgLst>
   <pc:docChgLst>
     <pc:chgData name="Adam Arkley" userId="d399d8a812f0f754" providerId="LiveId" clId="{0E84768E-2EC3-4932-A7D7-64CA7A4A8220}"/>
     <pc:docChg chg="undo redo custSel addSld delSld modSld sldOrd addSection delSection modSection">
@@ -835,69 +1282,6 @@
             <pc:docMk/>
             <pc:sldMk cId="4208729155" sldId="280"/>
             <ac:spMk id="7" creationId="{81C08BC2-19A8-464B-A2C7-FE134A960E49}"/>
-          </ac:spMkLst>
-        </pc:spChg>
-      </pc:sldChg>
-    </pc:docChg>
-  </pc:docChgLst>
-  <pc:docChgLst>
-    <pc:chgData name="Adam Arkley" userId="d399d8a812f0f754" providerId="LiveId" clId="{5DA6F803-D590-40BC-9578-3C76A3B4A6FA}"/>
-    <pc:docChg chg="custSel addSld modSld">
-      <pc:chgData name="Adam Arkley" userId="d399d8a812f0f754" providerId="LiveId" clId="{5DA6F803-D590-40BC-9578-3C76A3B4A6FA}" dt="2020-09-22T21:06:01.337" v="170" actId="20577"/>
-      <pc:docMkLst>
-        <pc:docMk/>
-      </pc:docMkLst>
-      <pc:sldChg chg="modSp mod">
-        <pc:chgData name="Adam Arkley" userId="d399d8a812f0f754" providerId="LiveId" clId="{5DA6F803-D590-40BC-9578-3C76A3B4A6FA}" dt="2020-09-22T21:05:24.885" v="166" actId="20577"/>
-        <pc:sldMkLst>
-          <pc:docMk/>
-          <pc:sldMk cId="4228031967" sldId="258"/>
-        </pc:sldMkLst>
-        <pc:spChg chg="mod">
-          <ac:chgData name="Adam Arkley" userId="d399d8a812f0f754" providerId="LiveId" clId="{5DA6F803-D590-40BC-9578-3C76A3B4A6FA}" dt="2020-09-22T21:03:58.487" v="20" actId="20577"/>
-          <ac:spMkLst>
-            <pc:docMk/>
-            <pc:sldMk cId="4228031967" sldId="258"/>
-            <ac:spMk id="7" creationId="{264D352A-6490-4480-892C-323D5009DE9E}"/>
-          </ac:spMkLst>
-        </pc:spChg>
-        <pc:spChg chg="mod">
-          <ac:chgData name="Adam Arkley" userId="d399d8a812f0f754" providerId="LiveId" clId="{5DA6F803-D590-40BC-9578-3C76A3B4A6FA}" dt="2020-09-22T21:05:24.885" v="166" actId="20577"/>
-          <ac:spMkLst>
-            <pc:docMk/>
-            <pc:sldMk cId="4228031967" sldId="258"/>
-            <ac:spMk id="8" creationId="{BE0E3DF2-7D61-4E65-B9C8-8C8786AC82BB}"/>
-          </ac:spMkLst>
-        </pc:spChg>
-      </pc:sldChg>
-      <pc:sldChg chg="modSp add mod modClrScheme chgLayout">
-        <pc:chgData name="Adam Arkley" userId="d399d8a812f0f754" providerId="LiveId" clId="{5DA6F803-D590-40BC-9578-3C76A3B4A6FA}" dt="2020-09-22T21:06:01.337" v="170" actId="20577"/>
-        <pc:sldMkLst>
-          <pc:docMk/>
-          <pc:sldMk cId="3925457643" sldId="260"/>
-        </pc:sldMkLst>
-        <pc:spChg chg="mod ord">
-          <ac:chgData name="Adam Arkley" userId="d399d8a812f0f754" providerId="LiveId" clId="{5DA6F803-D590-40BC-9578-3C76A3B4A6FA}" dt="2020-09-22T21:05:55.809" v="168" actId="700"/>
-          <ac:spMkLst>
-            <pc:docMk/>
-            <pc:sldMk cId="3925457643" sldId="260"/>
-            <ac:spMk id="6" creationId="{C5372D0A-E260-4F85-BA5F-02B997435337}"/>
-          </ac:spMkLst>
-        </pc:spChg>
-        <pc:spChg chg="mod ord">
-          <ac:chgData name="Adam Arkley" userId="d399d8a812f0f754" providerId="LiveId" clId="{5DA6F803-D590-40BC-9578-3C76A3B4A6FA}" dt="2020-09-22T21:05:55.809" v="168" actId="700"/>
-          <ac:spMkLst>
-            <pc:docMk/>
-            <pc:sldMk cId="3925457643" sldId="260"/>
-            <ac:spMk id="7" creationId="{81C08BC2-19A8-464B-A2C7-FE134A960E49}"/>
-          </ac:spMkLst>
-        </pc:spChg>
-        <pc:spChg chg="mod">
-          <ac:chgData name="Adam Arkley" userId="d399d8a812f0f754" providerId="LiveId" clId="{5DA6F803-D590-40BC-9578-3C76A3B4A6FA}" dt="2020-09-22T21:06:01.337" v="170" actId="20577"/>
-          <ac:spMkLst>
-            <pc:docMk/>
-            <pc:sldMk cId="3925457643" sldId="260"/>
-            <ac:spMk id="9" creationId="{2D93FB91-1CCB-4F40-8110-791759806717}"/>
           </ac:spMkLst>
         </pc:spChg>
       </pc:sldChg>
@@ -1646,447 +2030,63 @@
     </pc:docChg>
   </pc:docChgLst>
   <pc:docChgLst>
-    <pc:chgData name="Adam Arkley" userId="d399d8a812f0f754" providerId="LiveId" clId="{E93054AD-10A9-4843-AFF1-99DF7BB257C6}"/>
-    <pc:docChg chg="undo custSel addSld modSld sldOrd addSection delSection modSection">
-      <pc:chgData name="Adam Arkley" userId="d399d8a812f0f754" providerId="LiveId" clId="{E93054AD-10A9-4843-AFF1-99DF7BB257C6}" dt="2020-09-26T17:30:21.785" v="7354" actId="20577"/>
+    <pc:chgData name="Adam Arkley" userId="d399d8a812f0f754" providerId="LiveId" clId="{5DA6F803-D590-40BC-9578-3C76A3B4A6FA}"/>
+    <pc:docChg chg="custSel addSld modSld">
+      <pc:chgData name="Adam Arkley" userId="d399d8a812f0f754" providerId="LiveId" clId="{5DA6F803-D590-40BC-9578-3C76A3B4A6FA}" dt="2020-09-22T21:06:01.337" v="170" actId="20577"/>
       <pc:docMkLst>
         <pc:docMk/>
       </pc:docMkLst>
       <pc:sldChg chg="modSp mod">
-        <pc:chgData name="Adam Arkley" userId="d399d8a812f0f754" providerId="LiveId" clId="{E93054AD-10A9-4843-AFF1-99DF7BB257C6}" dt="2020-09-26T17:30:21.785" v="7354" actId="20577"/>
+        <pc:chgData name="Adam Arkley" userId="d399d8a812f0f754" providerId="LiveId" clId="{5DA6F803-D590-40BC-9578-3C76A3B4A6FA}" dt="2020-09-22T21:05:24.885" v="166" actId="20577"/>
         <pc:sldMkLst>
           <pc:docMk/>
-          <pc:sldMk cId="2701037055" sldId="256"/>
+          <pc:sldMk cId="4228031967" sldId="258"/>
         </pc:sldMkLst>
         <pc:spChg chg="mod">
-          <ac:chgData name="Adam Arkley" userId="d399d8a812f0f754" providerId="LiveId" clId="{E93054AD-10A9-4843-AFF1-99DF7BB257C6}" dt="2020-09-26T17:30:21.785" v="7354" actId="20577"/>
+          <ac:chgData name="Adam Arkley" userId="d399d8a812f0f754" providerId="LiveId" clId="{5DA6F803-D590-40BC-9578-3C76A3B4A6FA}" dt="2020-09-22T21:03:58.487" v="20" actId="20577"/>
           <ac:spMkLst>
             <pc:docMk/>
-            <pc:sldMk cId="2701037055" sldId="256"/>
-            <ac:spMk id="2" creationId="{B85CA9A3-4DC8-45AC-92F2-BEE16ECE63EB}"/>
+            <pc:sldMk cId="4228031967" sldId="258"/>
+            <ac:spMk id="7" creationId="{264D352A-6490-4480-892C-323D5009DE9E}"/>
           </ac:spMkLst>
         </pc:spChg>
         <pc:spChg chg="mod">
-          <ac:chgData name="Adam Arkley" userId="d399d8a812f0f754" providerId="LiveId" clId="{E93054AD-10A9-4843-AFF1-99DF7BB257C6}" dt="2020-09-26T17:02:07.794" v="7349" actId="20577"/>
+          <ac:chgData name="Adam Arkley" userId="d399d8a812f0f754" providerId="LiveId" clId="{5DA6F803-D590-40BC-9578-3C76A3B4A6FA}" dt="2020-09-22T21:05:24.885" v="166" actId="20577"/>
           <ac:spMkLst>
             <pc:docMk/>
-            <pc:sldMk cId="2701037055" sldId="256"/>
-            <ac:spMk id="4" creationId="{0F370610-8E27-43C6-88E0-34FB0AF38598}"/>
-          </ac:spMkLst>
-        </pc:spChg>
-        <pc:spChg chg="mod">
-          <ac:chgData name="Adam Arkley" userId="d399d8a812f0f754" providerId="LiveId" clId="{E93054AD-10A9-4843-AFF1-99DF7BB257C6}" dt="2020-09-26T17:02:09.730" v="7351" actId="20577"/>
-          <ac:spMkLst>
-            <pc:docMk/>
-            <pc:sldMk cId="2701037055" sldId="256"/>
-            <ac:spMk id="6" creationId="{424E565A-5570-49BD-91D8-FCEE7A8CF147}"/>
-          </ac:spMkLst>
-        </pc:spChg>
-      </pc:sldChg>
-      <pc:sldChg chg="modSp mod">
-        <pc:chgData name="Adam Arkley" userId="d399d8a812f0f754" providerId="LiveId" clId="{E93054AD-10A9-4843-AFF1-99DF7BB257C6}" dt="2020-09-26T16:30:37.121" v="3671" actId="6549"/>
-        <pc:sldMkLst>
-          <pc:docMk/>
-          <pc:sldMk cId="591849276" sldId="257"/>
-        </pc:sldMkLst>
-        <pc:spChg chg="mod">
-          <ac:chgData name="Adam Arkley" userId="d399d8a812f0f754" providerId="LiveId" clId="{E93054AD-10A9-4843-AFF1-99DF7BB257C6}" dt="2020-09-26T16:30:37.121" v="3671" actId="6549"/>
-          <ac:spMkLst>
-            <pc:docMk/>
-            <pc:sldMk cId="591849276" sldId="257"/>
+            <pc:sldMk cId="4228031967" sldId="258"/>
             <ac:spMk id="8" creationId="{BE0E3DF2-7D61-4E65-B9C8-8C8786AC82BB}"/>
           </ac:spMkLst>
         </pc:spChg>
       </pc:sldChg>
-      <pc:sldChg chg="addSp modSp mod">
-        <pc:chgData name="Adam Arkley" userId="d399d8a812f0f754" providerId="LiveId" clId="{E93054AD-10A9-4843-AFF1-99DF7BB257C6}" dt="2020-09-26T16:10:13.222" v="387" actId="1076"/>
+      <pc:sldChg chg="modSp add mod modClrScheme chgLayout">
+        <pc:chgData name="Adam Arkley" userId="d399d8a812f0f754" providerId="LiveId" clId="{5DA6F803-D590-40BC-9578-3C76A3B4A6FA}" dt="2020-09-22T21:06:01.337" v="170" actId="20577"/>
         <pc:sldMkLst>
           <pc:docMk/>
-          <pc:sldMk cId="842297462" sldId="280"/>
+          <pc:sldMk cId="3925457643" sldId="260"/>
         </pc:sldMkLst>
-        <pc:spChg chg="mod">
-          <ac:chgData name="Adam Arkley" userId="d399d8a812f0f754" providerId="LiveId" clId="{E93054AD-10A9-4843-AFF1-99DF7BB257C6}" dt="2020-09-26T16:10:10.043" v="385" actId="14100"/>
+        <pc:spChg chg="mod ord">
+          <ac:chgData name="Adam Arkley" userId="d399d8a812f0f754" providerId="LiveId" clId="{5DA6F803-D590-40BC-9578-3C76A3B4A6FA}" dt="2020-09-22T21:05:55.809" v="168" actId="700"/>
           <ac:spMkLst>
             <pc:docMk/>
-            <pc:sldMk cId="842297462" sldId="280"/>
+            <pc:sldMk cId="3925457643" sldId="260"/>
+            <ac:spMk id="6" creationId="{C5372D0A-E260-4F85-BA5F-02B997435337}"/>
+          </ac:spMkLst>
+        </pc:spChg>
+        <pc:spChg chg="mod ord">
+          <ac:chgData name="Adam Arkley" userId="d399d8a812f0f754" providerId="LiveId" clId="{5DA6F803-D590-40BC-9578-3C76A3B4A6FA}" dt="2020-09-22T21:05:55.809" v="168" actId="700"/>
+          <ac:spMkLst>
+            <pc:docMk/>
+            <pc:sldMk cId="3925457643" sldId="260"/>
             <ac:spMk id="7" creationId="{81C08BC2-19A8-464B-A2C7-FE134A960E49}"/>
           </ac:spMkLst>
         </pc:spChg>
-        <pc:picChg chg="add mod">
-          <ac:chgData name="Adam Arkley" userId="d399d8a812f0f754" providerId="LiveId" clId="{E93054AD-10A9-4843-AFF1-99DF7BB257C6}" dt="2020-09-26T16:10:13.222" v="387" actId="1076"/>
-          <ac:picMkLst>
-            <pc:docMk/>
-            <pc:sldMk cId="842297462" sldId="280"/>
-            <ac:picMk id="3" creationId="{D9F2B9E1-D7E9-4CCE-AAD9-EEA633C47420}"/>
-          </ac:picMkLst>
-        </pc:picChg>
-      </pc:sldChg>
-      <pc:sldChg chg="addSp modSp add mod ord">
-        <pc:chgData name="Adam Arkley" userId="d399d8a812f0f754" providerId="LiveId" clId="{E93054AD-10A9-4843-AFF1-99DF7BB257C6}" dt="2020-09-26T16:12:13.880" v="837" actId="20577"/>
-        <pc:sldMkLst>
-          <pc:docMk/>
-          <pc:sldMk cId="1894822069" sldId="281"/>
-        </pc:sldMkLst>
         <pc:spChg chg="mod">
-          <ac:chgData name="Adam Arkley" userId="d399d8a812f0f754" providerId="LiveId" clId="{E93054AD-10A9-4843-AFF1-99DF7BB257C6}" dt="2020-09-26T16:10:21.208" v="395" actId="20577"/>
+          <ac:chgData name="Adam Arkley" userId="d399d8a812f0f754" providerId="LiveId" clId="{5DA6F803-D590-40BC-9578-3C76A3B4A6FA}" dt="2020-09-22T21:06:01.337" v="170" actId="20577"/>
           <ac:spMkLst>
             <pc:docMk/>
-            <pc:sldMk cId="1894822069" sldId="281"/>
-            <ac:spMk id="6" creationId="{C5372D0A-E260-4F85-BA5F-02B997435337}"/>
-          </ac:spMkLst>
-        </pc:spChg>
-        <pc:spChg chg="mod">
-          <ac:chgData name="Adam Arkley" userId="d399d8a812f0f754" providerId="LiveId" clId="{E93054AD-10A9-4843-AFF1-99DF7BB257C6}" dt="2020-09-26T16:12:13.880" v="837" actId="20577"/>
-          <ac:spMkLst>
-            <pc:docMk/>
-            <pc:sldMk cId="1894822069" sldId="281"/>
-            <ac:spMk id="7" creationId="{81C08BC2-19A8-464B-A2C7-FE134A960E49}"/>
-          </ac:spMkLst>
-        </pc:spChg>
-        <pc:picChg chg="add mod">
-          <ac:chgData name="Adam Arkley" userId="d399d8a812f0f754" providerId="LiveId" clId="{E93054AD-10A9-4843-AFF1-99DF7BB257C6}" dt="2020-09-26T16:11:53.379" v="665" actId="1076"/>
-          <ac:picMkLst>
-            <pc:docMk/>
-            <pc:sldMk cId="1894822069" sldId="281"/>
-            <ac:picMk id="3" creationId="{98E18573-2B0F-4E91-BC70-DF42EFD70566}"/>
-          </ac:picMkLst>
-        </pc:picChg>
-      </pc:sldChg>
-      <pc:sldChg chg="addSp delSp modSp add mod">
-        <pc:chgData name="Adam Arkley" userId="d399d8a812f0f754" providerId="LiveId" clId="{E93054AD-10A9-4843-AFF1-99DF7BB257C6}" dt="2020-09-26T16:15:20.129" v="1224" actId="20577"/>
-        <pc:sldMkLst>
-          <pc:docMk/>
-          <pc:sldMk cId="862832244" sldId="282"/>
-        </pc:sldMkLst>
-        <pc:spChg chg="mod">
-          <ac:chgData name="Adam Arkley" userId="d399d8a812f0f754" providerId="LiveId" clId="{E93054AD-10A9-4843-AFF1-99DF7BB257C6}" dt="2020-09-26T16:15:20.129" v="1224" actId="20577"/>
-          <ac:spMkLst>
-            <pc:docMk/>
-            <pc:sldMk cId="862832244" sldId="282"/>
-            <ac:spMk id="7" creationId="{81C08BC2-19A8-464B-A2C7-FE134A960E49}"/>
-          </ac:spMkLst>
-        </pc:spChg>
-        <pc:picChg chg="del">
-          <ac:chgData name="Adam Arkley" userId="d399d8a812f0f754" providerId="LiveId" clId="{E93054AD-10A9-4843-AFF1-99DF7BB257C6}" dt="2020-09-26T16:14:26.543" v="839" actId="478"/>
-          <ac:picMkLst>
-            <pc:docMk/>
-            <pc:sldMk cId="862832244" sldId="282"/>
-            <ac:picMk id="3" creationId="{98E18573-2B0F-4E91-BC70-DF42EFD70566}"/>
-          </ac:picMkLst>
-        </pc:picChg>
-        <pc:picChg chg="add mod">
-          <ac:chgData name="Adam Arkley" userId="d399d8a812f0f754" providerId="LiveId" clId="{E93054AD-10A9-4843-AFF1-99DF7BB257C6}" dt="2020-09-26T16:14:32.523" v="842" actId="1076"/>
-          <ac:picMkLst>
-            <pc:docMk/>
-            <pc:sldMk cId="862832244" sldId="282"/>
-            <ac:picMk id="4" creationId="{43970568-6A7E-4DAB-BDB0-3B04E33C477A}"/>
-          </ac:picMkLst>
-        </pc:picChg>
-      </pc:sldChg>
-      <pc:sldChg chg="modSp add mod ord">
-        <pc:chgData name="Adam Arkley" userId="d399d8a812f0f754" providerId="LiveId" clId="{E93054AD-10A9-4843-AFF1-99DF7BB257C6}" dt="2020-09-26T16:18:51.925" v="2118" actId="20577"/>
-        <pc:sldMkLst>
-          <pc:docMk/>
-          <pc:sldMk cId="3477152732" sldId="283"/>
-        </pc:sldMkLst>
-        <pc:spChg chg="mod">
-          <ac:chgData name="Adam Arkley" userId="d399d8a812f0f754" providerId="LiveId" clId="{E93054AD-10A9-4843-AFF1-99DF7BB257C6}" dt="2020-09-26T16:15:29.887" v="1233" actId="20577"/>
-          <ac:spMkLst>
-            <pc:docMk/>
-            <pc:sldMk cId="3477152732" sldId="283"/>
-            <ac:spMk id="6" creationId="{C5372D0A-E260-4F85-BA5F-02B997435337}"/>
-          </ac:spMkLst>
-        </pc:spChg>
-        <pc:spChg chg="mod">
-          <ac:chgData name="Adam Arkley" userId="d399d8a812f0f754" providerId="LiveId" clId="{E93054AD-10A9-4843-AFF1-99DF7BB257C6}" dt="2020-09-26T16:18:51.925" v="2118" actId="20577"/>
-          <ac:spMkLst>
-            <pc:docMk/>
-            <pc:sldMk cId="3477152732" sldId="283"/>
-            <ac:spMk id="7" creationId="{81C08BC2-19A8-464B-A2C7-FE134A960E49}"/>
-          </ac:spMkLst>
-        </pc:spChg>
-      </pc:sldChg>
-      <pc:sldChg chg="modSp add mod">
-        <pc:chgData name="Adam Arkley" userId="d399d8a812f0f754" providerId="LiveId" clId="{E93054AD-10A9-4843-AFF1-99DF7BB257C6}" dt="2020-09-26T16:26:24.981" v="3059" actId="20577"/>
-        <pc:sldMkLst>
-          <pc:docMk/>
-          <pc:sldMk cId="383464206" sldId="284"/>
-        </pc:sldMkLst>
-        <pc:spChg chg="mod">
-          <ac:chgData name="Adam Arkley" userId="d399d8a812f0f754" providerId="LiveId" clId="{E93054AD-10A9-4843-AFF1-99DF7BB257C6}" dt="2020-09-26T16:19:47.707" v="2129" actId="20577"/>
-          <ac:spMkLst>
-            <pc:docMk/>
-            <pc:sldMk cId="383464206" sldId="284"/>
-            <ac:spMk id="6" creationId="{C5372D0A-E260-4F85-BA5F-02B997435337}"/>
-          </ac:spMkLst>
-        </pc:spChg>
-        <pc:spChg chg="mod">
-          <ac:chgData name="Adam Arkley" userId="d399d8a812f0f754" providerId="LiveId" clId="{E93054AD-10A9-4843-AFF1-99DF7BB257C6}" dt="2020-09-26T16:26:24.981" v="3059" actId="20577"/>
-          <ac:spMkLst>
-            <pc:docMk/>
-            <pc:sldMk cId="383464206" sldId="284"/>
-            <ac:spMk id="7" creationId="{81C08BC2-19A8-464B-A2C7-FE134A960E49}"/>
-          </ac:spMkLst>
-        </pc:spChg>
-      </pc:sldChg>
-      <pc:sldChg chg="addSp modSp add mod ord">
-        <pc:chgData name="Adam Arkley" userId="d399d8a812f0f754" providerId="LiveId" clId="{E93054AD-10A9-4843-AFF1-99DF7BB257C6}" dt="2020-09-26T16:23:55.895" v="2641"/>
-        <pc:sldMkLst>
-          <pc:docMk/>
-          <pc:sldMk cId="41099643" sldId="285"/>
-        </pc:sldMkLst>
-        <pc:spChg chg="mod">
-          <ac:chgData name="Adam Arkley" userId="d399d8a812f0f754" providerId="LiveId" clId="{E93054AD-10A9-4843-AFF1-99DF7BB257C6}" dt="2020-09-26T16:21:09.288" v="2147" actId="20577"/>
-          <ac:spMkLst>
-            <pc:docMk/>
-            <pc:sldMk cId="41099643" sldId="285"/>
-            <ac:spMk id="6" creationId="{C5372D0A-E260-4F85-BA5F-02B997435337}"/>
-          </ac:spMkLst>
-        </pc:spChg>
-        <pc:spChg chg="mod">
-          <ac:chgData name="Adam Arkley" userId="d399d8a812f0f754" providerId="LiveId" clId="{E93054AD-10A9-4843-AFF1-99DF7BB257C6}" dt="2020-09-26T16:22:00.483" v="2517" actId="20577"/>
-          <ac:spMkLst>
-            <pc:docMk/>
-            <pc:sldMk cId="41099643" sldId="285"/>
-            <ac:spMk id="7" creationId="{81C08BC2-19A8-464B-A2C7-FE134A960E49}"/>
-          </ac:spMkLst>
-        </pc:spChg>
-        <pc:graphicFrameChg chg="add mod modGraphic">
-          <ac:chgData name="Adam Arkley" userId="d399d8a812f0f754" providerId="LiveId" clId="{E93054AD-10A9-4843-AFF1-99DF7BB257C6}" dt="2020-09-26T16:23:52.736" v="2639" actId="1076"/>
-          <ac:graphicFrameMkLst>
-            <pc:docMk/>
-            <pc:sldMk cId="41099643" sldId="285"/>
-            <ac:graphicFrameMk id="2" creationId="{4F625300-029E-4D4D-A08F-445DE3795F69}"/>
-          </ac:graphicFrameMkLst>
-        </pc:graphicFrameChg>
-      </pc:sldChg>
-      <pc:sldChg chg="modSp add mod ord">
-        <pc:chgData name="Adam Arkley" userId="d399d8a812f0f754" providerId="LiveId" clId="{E93054AD-10A9-4843-AFF1-99DF7BB257C6}" dt="2020-09-26T16:29:27.551" v="3670" actId="20577"/>
-        <pc:sldMkLst>
-          <pc:docMk/>
-          <pc:sldMk cId="2213527629" sldId="286"/>
-        </pc:sldMkLst>
-        <pc:spChg chg="mod">
-          <ac:chgData name="Adam Arkley" userId="d399d8a812f0f754" providerId="LiveId" clId="{E93054AD-10A9-4843-AFF1-99DF7BB257C6}" dt="2020-09-26T16:26:45.663" v="3096" actId="20577"/>
-          <ac:spMkLst>
-            <pc:docMk/>
-            <pc:sldMk cId="2213527629" sldId="286"/>
-            <ac:spMk id="6" creationId="{C5372D0A-E260-4F85-BA5F-02B997435337}"/>
-          </ac:spMkLst>
-        </pc:spChg>
-        <pc:spChg chg="mod">
-          <ac:chgData name="Adam Arkley" userId="d399d8a812f0f754" providerId="LiveId" clId="{E93054AD-10A9-4843-AFF1-99DF7BB257C6}" dt="2020-09-26T16:29:27.551" v="3670" actId="20577"/>
-          <ac:spMkLst>
-            <pc:docMk/>
-            <pc:sldMk cId="2213527629" sldId="286"/>
-            <ac:spMk id="7" creationId="{81C08BC2-19A8-464B-A2C7-FE134A960E49}"/>
-          </ac:spMkLst>
-        </pc:spChg>
-      </pc:sldChg>
-      <pc:sldChg chg="modSp add mod ord">
-        <pc:chgData name="Adam Arkley" userId="d399d8a812f0f754" providerId="LiveId" clId="{E93054AD-10A9-4843-AFF1-99DF7BB257C6}" dt="2020-09-26T16:33:54.715" v="3751" actId="20577"/>
-        <pc:sldMkLst>
-          <pc:docMk/>
-          <pc:sldMk cId="1966687124" sldId="287"/>
-        </pc:sldMkLst>
-        <pc:spChg chg="mod">
-          <ac:chgData name="Adam Arkley" userId="d399d8a812f0f754" providerId="LiveId" clId="{E93054AD-10A9-4843-AFF1-99DF7BB257C6}" dt="2020-09-26T16:30:52.926" v="3683" actId="20577"/>
-          <ac:spMkLst>
-            <pc:docMk/>
-            <pc:sldMk cId="1966687124" sldId="287"/>
-            <ac:spMk id="7" creationId="{264D352A-6490-4480-892C-323D5009DE9E}"/>
-          </ac:spMkLst>
-        </pc:spChg>
-        <pc:spChg chg="mod">
-          <ac:chgData name="Adam Arkley" userId="d399d8a812f0f754" providerId="LiveId" clId="{E93054AD-10A9-4843-AFF1-99DF7BB257C6}" dt="2020-09-26T16:33:54.715" v="3751" actId="20577"/>
-          <ac:spMkLst>
-            <pc:docMk/>
-            <pc:sldMk cId="1966687124" sldId="287"/>
-            <ac:spMk id="8" creationId="{BE0E3DF2-7D61-4E65-B9C8-8C8786AC82BB}"/>
-          </ac:spMkLst>
-        </pc:spChg>
-      </pc:sldChg>
-      <pc:sldChg chg="modSp add mod ord">
-        <pc:chgData name="Adam Arkley" userId="d399d8a812f0f754" providerId="LiveId" clId="{E93054AD-10A9-4843-AFF1-99DF7BB257C6}" dt="2020-09-26T16:46:33.777" v="4813" actId="20577"/>
-        <pc:sldMkLst>
-          <pc:docMk/>
-          <pc:sldMk cId="424534578" sldId="288"/>
-        </pc:sldMkLst>
-        <pc:spChg chg="mod">
-          <ac:chgData name="Adam Arkley" userId="d399d8a812f0f754" providerId="LiveId" clId="{E93054AD-10A9-4843-AFF1-99DF7BB257C6}" dt="2020-09-26T16:45:46.271" v="4560" actId="20577"/>
-          <ac:spMkLst>
-            <pc:docMk/>
-            <pc:sldMk cId="424534578" sldId="288"/>
-            <ac:spMk id="6" creationId="{C5372D0A-E260-4F85-BA5F-02B997435337}"/>
-          </ac:spMkLst>
-        </pc:spChg>
-        <pc:spChg chg="mod">
-          <ac:chgData name="Adam Arkley" userId="d399d8a812f0f754" providerId="LiveId" clId="{E93054AD-10A9-4843-AFF1-99DF7BB257C6}" dt="2020-09-26T16:46:33.777" v="4813" actId="20577"/>
-          <ac:spMkLst>
-            <pc:docMk/>
-            <pc:sldMk cId="424534578" sldId="288"/>
-            <ac:spMk id="7" creationId="{81C08BC2-19A8-464B-A2C7-FE134A960E49}"/>
-          </ac:spMkLst>
-        </pc:spChg>
-      </pc:sldChg>
-      <pc:sldChg chg="modSp add mod ord">
-        <pc:chgData name="Adam Arkley" userId="d399d8a812f0f754" providerId="LiveId" clId="{E93054AD-10A9-4843-AFF1-99DF7BB257C6}" dt="2020-09-26T16:45:35.606" v="4523"/>
-        <pc:sldMkLst>
-          <pc:docMk/>
-          <pc:sldMk cId="3942793224" sldId="289"/>
-        </pc:sldMkLst>
-        <pc:spChg chg="mod">
-          <ac:chgData name="Adam Arkley" userId="d399d8a812f0f754" providerId="LiveId" clId="{E93054AD-10A9-4843-AFF1-99DF7BB257C6}" dt="2020-09-26T16:45:34.612" v="4521"/>
-          <ac:spMkLst>
-            <pc:docMk/>
-            <pc:sldMk cId="3942793224" sldId="289"/>
-            <ac:spMk id="7" creationId="{81C08BC2-19A8-464B-A2C7-FE134A960E49}"/>
-          </ac:spMkLst>
-        </pc:spChg>
-      </pc:sldChg>
-      <pc:sldChg chg="addSp delSp modSp add mod">
-        <pc:chgData name="Adam Arkley" userId="d399d8a812f0f754" providerId="LiveId" clId="{E93054AD-10A9-4843-AFF1-99DF7BB257C6}" dt="2020-09-26T16:54:09.396" v="5354" actId="255"/>
-        <pc:sldMkLst>
-          <pc:docMk/>
-          <pc:sldMk cId="1298131675" sldId="290"/>
-        </pc:sldMkLst>
-        <pc:spChg chg="mod">
-          <ac:chgData name="Adam Arkley" userId="d399d8a812f0f754" providerId="LiveId" clId="{E93054AD-10A9-4843-AFF1-99DF7BB257C6}" dt="2020-09-26T16:46:55.970" v="4821" actId="20577"/>
-          <ac:spMkLst>
-            <pc:docMk/>
-            <pc:sldMk cId="1298131675" sldId="290"/>
-            <ac:spMk id="6" creationId="{C5372D0A-E260-4F85-BA5F-02B997435337}"/>
-          </ac:spMkLst>
-        </pc:spChg>
-        <pc:spChg chg="mod">
-          <ac:chgData name="Adam Arkley" userId="d399d8a812f0f754" providerId="LiveId" clId="{E93054AD-10A9-4843-AFF1-99DF7BB257C6}" dt="2020-09-26T16:54:09.396" v="5354" actId="255"/>
-          <ac:spMkLst>
-            <pc:docMk/>
-            <pc:sldMk cId="1298131675" sldId="290"/>
-            <ac:spMk id="7" creationId="{81C08BC2-19A8-464B-A2C7-FE134A960E49}"/>
-          </ac:spMkLst>
-        </pc:spChg>
-        <pc:picChg chg="add del mod">
-          <ac:chgData name="Adam Arkley" userId="d399d8a812f0f754" providerId="LiveId" clId="{E93054AD-10A9-4843-AFF1-99DF7BB257C6}" dt="2020-09-26T16:52:16.819" v="5093" actId="21"/>
-          <ac:picMkLst>
-            <pc:docMk/>
-            <pc:sldMk cId="1298131675" sldId="290"/>
-            <ac:picMk id="3" creationId="{9E4A8263-DA0D-4BED-8E02-E63E61F018C9}"/>
-          </ac:picMkLst>
-        </pc:picChg>
-        <pc:picChg chg="add mod">
-          <ac:chgData name="Adam Arkley" userId="d399d8a812f0f754" providerId="LiveId" clId="{E93054AD-10A9-4843-AFF1-99DF7BB257C6}" dt="2020-09-26T16:52:35.673" v="5098" actId="1076"/>
-          <ac:picMkLst>
-            <pc:docMk/>
-            <pc:sldMk cId="1298131675" sldId="290"/>
-            <ac:picMk id="5" creationId="{0514DE11-F2CE-45C7-BF35-1E56DA6C7284}"/>
-          </ac:picMkLst>
-        </pc:picChg>
-      </pc:sldChg>
-      <pc:sldChg chg="modSp add mod ord">
-        <pc:chgData name="Adam Arkley" userId="d399d8a812f0f754" providerId="LiveId" clId="{E93054AD-10A9-4843-AFF1-99DF7BB257C6}" dt="2020-09-26T16:57:55.902" v="6047" actId="20577"/>
-        <pc:sldMkLst>
-          <pc:docMk/>
-          <pc:sldMk cId="1126652675" sldId="291"/>
-        </pc:sldMkLst>
-        <pc:spChg chg="mod">
-          <ac:chgData name="Adam Arkley" userId="d399d8a812f0f754" providerId="LiveId" clId="{E93054AD-10A9-4843-AFF1-99DF7BB257C6}" dt="2020-09-26T16:55:37.417" v="5364" actId="20577"/>
-          <ac:spMkLst>
-            <pc:docMk/>
-            <pc:sldMk cId="1126652675" sldId="291"/>
-            <ac:spMk id="6" creationId="{C5372D0A-E260-4F85-BA5F-02B997435337}"/>
-          </ac:spMkLst>
-        </pc:spChg>
-        <pc:spChg chg="mod">
-          <ac:chgData name="Adam Arkley" userId="d399d8a812f0f754" providerId="LiveId" clId="{E93054AD-10A9-4843-AFF1-99DF7BB257C6}" dt="2020-09-26T16:57:55.902" v="6047" actId="20577"/>
-          <ac:spMkLst>
-            <pc:docMk/>
-            <pc:sldMk cId="1126652675" sldId="291"/>
-            <ac:spMk id="7" creationId="{81C08BC2-19A8-464B-A2C7-FE134A960E49}"/>
-          </ac:spMkLst>
-        </pc:spChg>
-      </pc:sldChg>
-      <pc:sldChg chg="modSp add mod ord">
-        <pc:chgData name="Adam Arkley" userId="d399d8a812f0f754" providerId="LiveId" clId="{E93054AD-10A9-4843-AFF1-99DF7BB257C6}" dt="2020-09-26T16:58:20.312" v="6103" actId="20577"/>
-        <pc:sldMkLst>
-          <pc:docMk/>
-          <pc:sldMk cId="4159823134" sldId="292"/>
-        </pc:sldMkLst>
-        <pc:spChg chg="mod">
-          <ac:chgData name="Adam Arkley" userId="d399d8a812f0f754" providerId="LiveId" clId="{E93054AD-10A9-4843-AFF1-99DF7BB257C6}" dt="2020-09-26T16:58:15.767" v="6078" actId="20577"/>
-          <ac:spMkLst>
-            <pc:docMk/>
-            <pc:sldMk cId="4159823134" sldId="292"/>
-            <ac:spMk id="7" creationId="{264D352A-6490-4480-892C-323D5009DE9E}"/>
-          </ac:spMkLst>
-        </pc:spChg>
-        <pc:spChg chg="mod">
-          <ac:chgData name="Adam Arkley" userId="d399d8a812f0f754" providerId="LiveId" clId="{E93054AD-10A9-4843-AFF1-99DF7BB257C6}" dt="2020-09-26T16:58:20.312" v="6103" actId="20577"/>
-          <ac:spMkLst>
-            <pc:docMk/>
-            <pc:sldMk cId="4159823134" sldId="292"/>
-            <ac:spMk id="8" creationId="{BE0E3DF2-7D61-4E65-B9C8-8C8786AC82BB}"/>
-          </ac:spMkLst>
-        </pc:spChg>
-      </pc:sldChg>
-      <pc:sldChg chg="modSp add mod ord">
-        <pc:chgData name="Adam Arkley" userId="d399d8a812f0f754" providerId="LiveId" clId="{E93054AD-10A9-4843-AFF1-99DF7BB257C6}" dt="2020-09-26T17:01:53.160" v="7343" actId="20577"/>
-        <pc:sldMkLst>
-          <pc:docMk/>
-          <pc:sldMk cId="1706075808" sldId="293"/>
-        </pc:sldMkLst>
-        <pc:spChg chg="mod">
-          <ac:chgData name="Adam Arkley" userId="d399d8a812f0f754" providerId="LiveId" clId="{E93054AD-10A9-4843-AFF1-99DF7BB257C6}" dt="2020-09-26T17:01:11.011" v="6982" actId="20577"/>
-          <ac:spMkLst>
-            <pc:docMk/>
-            <pc:sldMk cId="1706075808" sldId="293"/>
-            <ac:spMk id="6" creationId="{C5372D0A-E260-4F85-BA5F-02B997435337}"/>
-          </ac:spMkLst>
-        </pc:spChg>
-        <pc:spChg chg="mod">
-          <ac:chgData name="Adam Arkley" userId="d399d8a812f0f754" providerId="LiveId" clId="{E93054AD-10A9-4843-AFF1-99DF7BB257C6}" dt="2020-09-26T17:01:53.160" v="7343" actId="20577"/>
-          <ac:spMkLst>
-            <pc:docMk/>
-            <pc:sldMk cId="1706075808" sldId="293"/>
-            <ac:spMk id="7" creationId="{81C08BC2-19A8-464B-A2C7-FE134A960E49}"/>
-          </ac:spMkLst>
-        </pc:spChg>
-      </pc:sldChg>
-      <pc:sldChg chg="addSp modSp add mod">
-        <pc:chgData name="Adam Arkley" userId="d399d8a812f0f754" providerId="LiveId" clId="{E93054AD-10A9-4843-AFF1-99DF7BB257C6}" dt="2020-09-26T17:00:21.291" v="6583" actId="255"/>
-        <pc:sldMkLst>
-          <pc:docMk/>
-          <pc:sldMk cId="2356349418" sldId="294"/>
-        </pc:sldMkLst>
-        <pc:spChg chg="mod">
-          <ac:chgData name="Adam Arkley" userId="d399d8a812f0f754" providerId="LiveId" clId="{E93054AD-10A9-4843-AFF1-99DF7BB257C6}" dt="2020-09-26T17:00:21.291" v="6583" actId="255"/>
-          <ac:spMkLst>
-            <pc:docMk/>
-            <pc:sldMk cId="2356349418" sldId="294"/>
-            <ac:spMk id="7" creationId="{81C08BC2-19A8-464B-A2C7-FE134A960E49}"/>
-          </ac:spMkLst>
-        </pc:spChg>
-        <pc:picChg chg="add mod">
-          <ac:chgData name="Adam Arkley" userId="d399d8a812f0f754" providerId="LiveId" clId="{E93054AD-10A9-4843-AFF1-99DF7BB257C6}" dt="2020-09-26T16:59:52.519" v="6516" actId="1076"/>
-          <ac:picMkLst>
-            <pc:docMk/>
-            <pc:sldMk cId="2356349418" sldId="294"/>
-            <ac:picMk id="3" creationId="{9EADA46F-A349-409E-BEC5-E81117F26BB3}"/>
-          </ac:picMkLst>
-        </pc:picChg>
-      </pc:sldChg>
-      <pc:sldChg chg="modSp add mod ord">
-        <pc:chgData name="Adam Arkley" userId="d399d8a812f0f754" providerId="LiveId" clId="{E93054AD-10A9-4843-AFF1-99DF7BB257C6}" dt="2020-09-26T17:01:05.887" v="6957" actId="20577"/>
-        <pc:sldMkLst>
-          <pc:docMk/>
-          <pc:sldMk cId="769937497" sldId="295"/>
-        </pc:sldMkLst>
-        <pc:spChg chg="mod">
-          <ac:chgData name="Adam Arkley" userId="d399d8a812f0f754" providerId="LiveId" clId="{E93054AD-10A9-4843-AFF1-99DF7BB257C6}" dt="2020-09-26T17:01:05.887" v="6957" actId="20577"/>
-          <ac:spMkLst>
-            <pc:docMk/>
-            <pc:sldMk cId="769937497" sldId="295"/>
-            <ac:spMk id="7" creationId="{81C08BC2-19A8-464B-A2C7-FE134A960E49}"/>
+            <pc:sldMk cId="3925457643" sldId="260"/>
+            <ac:spMk id="9" creationId="{2D93FB91-1CCB-4F40-8110-791759806717}"/>
           </ac:spMkLst>
         </pc:spChg>
       </pc:sldChg>
@@ -2178,7 +2178,7 @@
             <a:fld id="{C89BED82-0386-424B-8522-487198B6AAA6}" type="datetimeFigureOut">
               <a:rPr lang="nb-NO" smtClean="0"/>
               <a:pPr/>
-              <a:t>26.09.2020</a:t>
+              <a:t>02.10.2020</a:t>
             </a:fld>
             <a:endParaRPr lang="nb-NO"/>
           </a:p>
@@ -2730,7 +2730,7 @@
           <a:p>
             <a:fld id="{3434F07C-7B4A-4A07-9283-14DC65FBC703}" type="datetimeFigureOut">
               <a:rPr lang="en-GB" smtClean="0"/>
-              <a:t>26/09/2020</a:t>
+              <a:t>02/10/2020</a:t>
             </a:fld>
             <a:endParaRPr lang="en-GB"/>
           </a:p>
@@ -2970,7 +2970,7 @@
           <a:p>
             <a:fld id="{3434F07C-7B4A-4A07-9283-14DC65FBC703}" type="datetimeFigureOut">
               <a:rPr lang="en-GB" smtClean="0"/>
-              <a:t>26/09/2020</a:t>
+              <a:t>02/10/2020</a:t>
             </a:fld>
             <a:endParaRPr lang="en-GB"/>
           </a:p>
@@ -3247,7 +3247,7 @@
             <a:fld id="{BB56636F-9E64-48A9-A0E8-D6911EA208CE}" type="datetimeFigureOut">
               <a:rPr lang="nb-NO" smtClean="0"/>
               <a:pPr/>
-              <a:t>26.09.2020</a:t>
+              <a:t>02.10.2020</a:t>
             </a:fld>
             <a:endParaRPr lang="nb-NO"/>
           </a:p>
@@ -3941,7 +3941,7 @@
           <a:p>
             <a:fld id="{3434F07C-7B4A-4A07-9283-14DC65FBC703}" type="datetimeFigureOut">
               <a:rPr lang="en-GB" smtClean="0"/>
-              <a:t>26/09/2020</a:t>
+              <a:t>02/10/2020</a:t>
             </a:fld>
             <a:endParaRPr lang="en-GB"/>
           </a:p>
@@ -4247,7 +4247,7 @@
           <a:p>
             <a:fld id="{3434F07C-7B4A-4A07-9283-14DC65FBC703}" type="datetimeFigureOut">
               <a:rPr lang="en-GB" smtClean="0"/>
-              <a:t>26/09/2020</a:t>
+              <a:t>02/10/2020</a:t>
             </a:fld>
             <a:endParaRPr lang="en-GB"/>
           </a:p>
@@ -4701,7 +4701,7 @@
           <a:p>
             <a:fld id="{3434F07C-7B4A-4A07-9283-14DC65FBC703}" type="datetimeFigureOut">
               <a:rPr lang="en-GB" smtClean="0"/>
-              <a:t>26/09/2020</a:t>
+              <a:t>02/10/2020</a:t>
             </a:fld>
             <a:endParaRPr lang="en-GB"/>
           </a:p>
@@ -4875,7 +4875,7 @@
           <a:p>
             <a:fld id="{3434F07C-7B4A-4A07-9283-14DC65FBC703}" type="datetimeFigureOut">
               <a:rPr lang="en-GB" smtClean="0"/>
-              <a:t>26/09/2020</a:t>
+              <a:t>02/10/2020</a:t>
             </a:fld>
             <a:endParaRPr lang="en-GB"/>
           </a:p>
@@ -5115,7 +5115,7 @@
           <a:p>
             <a:fld id="{3434F07C-7B4A-4A07-9283-14DC65FBC703}" type="datetimeFigureOut">
               <a:rPr lang="en-GB" smtClean="0"/>
-              <a:t>26/09/2020</a:t>
+              <a:t>02/10/2020</a:t>
             </a:fld>
             <a:endParaRPr lang="en-GB"/>
           </a:p>
@@ -5252,7 +5252,7 @@
           <a:p>
             <a:fld id="{3434F07C-7B4A-4A07-9283-14DC65FBC703}" type="datetimeFigureOut">
               <a:rPr lang="en-GB" smtClean="0"/>
-              <a:t>26/09/2020</a:t>
+              <a:t>02/10/2020</a:t>
             </a:fld>
             <a:endParaRPr lang="en-GB"/>
           </a:p>
@@ -5598,7 +5598,7 @@
           <a:p>
             <a:fld id="{3434F07C-7B4A-4A07-9283-14DC65FBC703}" type="datetimeFigureOut">
               <a:rPr lang="en-GB" smtClean="0"/>
-              <a:t>26/09/2020</a:t>
+              <a:t>02/10/2020</a:t>
             </a:fld>
             <a:endParaRPr lang="en-GB"/>
           </a:p>
@@ -5920,7 +5920,7 @@
           <a:p>
             <a:fld id="{3434F07C-7B4A-4A07-9283-14DC65FBC703}" type="datetimeFigureOut">
               <a:rPr lang="en-GB" smtClean="0"/>
-              <a:t>26/09/2020</a:t>
+              <a:t>02/10/2020</a:t>
             </a:fld>
             <a:endParaRPr lang="en-GB"/>
           </a:p>
@@ -6160,7 +6160,7 @@
           <a:p>
             <a:fld id="{3434F07C-7B4A-4A07-9283-14DC65FBC703}" type="datetimeFigureOut">
               <a:rPr lang="en-GB" smtClean="0"/>
-              <a:t>26/09/2020</a:t>
+              <a:t>02/10/2020</a:t>
             </a:fld>
             <a:endParaRPr lang="en-GB"/>
           </a:p>
@@ -6400,7 +6400,7 @@
           <a:p>
             <a:fld id="{3434F07C-7B4A-4A07-9283-14DC65FBC703}" type="datetimeFigureOut">
               <a:rPr lang="en-GB" smtClean="0"/>
-              <a:t>26/09/2020</a:t>
+              <a:t>02/10/2020</a:t>
             </a:fld>
             <a:endParaRPr lang="en-GB"/>
           </a:p>
@@ -6677,7 +6677,7 @@
             <a:fld id="{BB56636F-9E64-48A9-A0E8-D6911EA208CE}" type="datetimeFigureOut">
               <a:rPr lang="nb-NO" smtClean="0"/>
               <a:pPr/>
-              <a:t>26.09.2020</a:t>
+              <a:t>02.10.2020</a:t>
             </a:fld>
             <a:endParaRPr lang="nb-NO"/>
           </a:p>
@@ -6972,7 +6972,7 @@
           <a:p>
             <a:fld id="{3434F07C-7B4A-4A07-9283-14DC65FBC703}" type="datetimeFigureOut">
               <a:rPr lang="en-GB" smtClean="0"/>
-              <a:t>26/09/2020</a:t>
+              <a:t>02/10/2020</a:t>
             </a:fld>
             <a:endParaRPr lang="en-GB"/>
           </a:p>
@@ -7278,7 +7278,7 @@
           <a:p>
             <a:fld id="{3434F07C-7B4A-4A07-9283-14DC65FBC703}" type="datetimeFigureOut">
               <a:rPr lang="en-GB" smtClean="0"/>
-              <a:t>26/09/2020</a:t>
+              <a:t>02/10/2020</a:t>
             </a:fld>
             <a:endParaRPr lang="en-GB"/>
           </a:p>
@@ -7732,7 +7732,7 @@
           <a:p>
             <a:fld id="{3434F07C-7B4A-4A07-9283-14DC65FBC703}" type="datetimeFigureOut">
               <a:rPr lang="en-GB" smtClean="0"/>
-              <a:t>26/09/2020</a:t>
+              <a:t>02/10/2020</a:t>
             </a:fld>
             <a:endParaRPr lang="en-GB"/>
           </a:p>
@@ -7906,7 +7906,7 @@
           <a:p>
             <a:fld id="{3434F07C-7B4A-4A07-9283-14DC65FBC703}" type="datetimeFigureOut">
               <a:rPr lang="en-GB" smtClean="0"/>
-              <a:t>26/09/2020</a:t>
+              <a:t>02/10/2020</a:t>
             </a:fld>
             <a:endParaRPr lang="en-GB"/>
           </a:p>
@@ -8043,7 +8043,7 @@
           <a:p>
             <a:fld id="{3434F07C-7B4A-4A07-9283-14DC65FBC703}" type="datetimeFigureOut">
               <a:rPr lang="en-GB" smtClean="0"/>
-              <a:t>26/09/2020</a:t>
+              <a:t>02/10/2020</a:t>
             </a:fld>
             <a:endParaRPr lang="en-GB"/>
           </a:p>
@@ -8389,7 +8389,7 @@
           <a:p>
             <a:fld id="{3434F07C-7B4A-4A07-9283-14DC65FBC703}" type="datetimeFigureOut">
               <a:rPr lang="en-GB" smtClean="0"/>
-              <a:t>26/09/2020</a:t>
+              <a:t>02/10/2020</a:t>
             </a:fld>
             <a:endParaRPr lang="en-GB"/>
           </a:p>
@@ -8711,7 +8711,7 @@
           <a:p>
             <a:fld id="{3434F07C-7B4A-4A07-9283-14DC65FBC703}" type="datetimeFigureOut">
               <a:rPr lang="en-GB" smtClean="0"/>
-              <a:t>26/09/2020</a:t>
+              <a:t>02/10/2020</a:t>
             </a:fld>
             <a:endParaRPr lang="en-GB"/>
           </a:p>
@@ -10441,7 +10441,7 @@
           <a:p>
             <a:r>
               <a:rPr lang="en-GB" sz="2600" dirty="0"/>
-              <a:t>The Run and Break</a:t>
+              <a:t>The Overhead Break</a:t>
             </a:r>
           </a:p>
           <a:p>
@@ -10861,7 +10861,7 @@
           <a:p>
             <a:r>
               <a:rPr lang="en-GB" sz="3700" dirty="0"/>
-              <a:t>The Run and Break</a:t>
+              <a:t>The Overhead Break</a:t>
             </a:r>
           </a:p>
         </p:txBody>
@@ -10889,13 +10889,13 @@
           <a:p>
             <a:r>
               <a:rPr lang="en-GB" sz="2200" dirty="0"/>
-              <a:t>The most expeditious method for a formation to join the circuit is using the Run and Break.</a:t>
+              <a:t>The most expeditious method for a formation to join the circuit is using the Overhead Break.</a:t>
             </a:r>
           </a:p>
           <a:p>
             <a:r>
               <a:rPr lang="en-GB" sz="2200" dirty="0"/>
-              <a:t>The Run and Break involves a formation of aircraft flying along the axis of the active runway at speed, before turning tightly onto the downwind leg at intervals to break up the formation and reduce speed.</a:t>
+              <a:t>The Overhead Break involves a formation of aircraft flying along the axis of the active runway at speed, before turning tightly onto the downwind leg at intervals to break up the formation and reduce speed.</a:t>
             </a:r>
           </a:p>
           <a:p>
@@ -11014,7 +11014,7 @@
           <a:p>
             <a:r>
               <a:rPr lang="en-GB" sz="3700" dirty="0"/>
-              <a:t>The Run and Break</a:t>
+              <a:t>The Overhead Break</a:t>
             </a:r>
           </a:p>
         </p:txBody>
@@ -11048,7 +11048,7 @@
           <a:p>
             <a:r>
               <a:rPr lang="en-GB" sz="2400" dirty="0"/>
-              <a:t>The Run and Break is concluded when the aircraft is rolled out onto the downwind leg, at a position referred to as ‘perch’. </a:t>
+              <a:t>The Overhead Break is concluded when the aircraft is rolled out onto the downwind leg, at a position referred to as ‘perch’. </a:t>
             </a:r>
           </a:p>
         </p:txBody>
@@ -11327,7 +11327,7 @@
             <a:pPr lvl="1"/>
             <a:r>
               <a:rPr lang="en-GB" sz="2000" dirty="0"/>
-              <a:t>For aircraft performing a Run and Break, the formation must report crossing ‘initial’.</a:t>
+              <a:t>For aircraft performing an Overhead Break, the formation must report crossing ‘initial’.</a:t>
             </a:r>
           </a:p>
         </p:txBody>
@@ -15545,7 +15545,7 @@
           <p:nvPr/>
         </p:nvPicPr>
         <p:blipFill>
-          <a:blip r:embed="rId2">
+          <a:blip r:embed="rId2" cstate="print">
             <a:extLst>
               <a:ext uri="{28A0092B-C50C-407E-A947-70E740481C1C}">
                 <a14:useLocalDpi xmlns:a14="http://schemas.microsoft.com/office/drawing/2010/main" val="0"/>
@@ -16026,7 +16026,7 @@
           <p:nvPr/>
         </p:nvPicPr>
         <p:blipFill>
-          <a:blip r:embed="rId2">
+          <a:blip r:embed="rId2" cstate="print">
             <a:extLst>
               <a:ext uri="{28A0092B-C50C-407E-A947-70E740481C1C}">
                 <a14:useLocalDpi xmlns:a14="http://schemas.microsoft.com/office/drawing/2010/main" val="0"/>

</xml_diff>